<commit_message>
VDM recursive function presentation
</commit_message>
<xml_diff>
--- a/plugins/vdm2isa/pub/recursion/talk/VDM recursion in Isabelle_HOL (Overture 2023).pptx
+++ b/plugins/vdm2isa/pub/recursion/talk/VDM recursion in Isabelle_HOL (Overture 2023).pptx
@@ -14108,10 +14108,18 @@
               <a:buAutoNum type="arabicPeriod"/>
             </a:pPr>
             <a:r>
-              <a:rPr lang="en"/>
-              <a:t>Maharaj &amp; Bicarregui (shallow) embedding of VDM in PVS (1998)</a:t>
-            </a:r>
-            <a:endParaRPr/>
+              <a:rPr lang="en" dirty="0"/>
+              <a:t>Maharaj &amp; </a:t>
+            </a:r>
+            <a:r>
+              <a:rPr lang="en" dirty="0" err="1"/>
+              <a:t>Bicarregui</a:t>
+            </a:r>
+            <a:r>
+              <a:rPr lang="en" dirty="0"/>
+              <a:t> (shallow) embedding of VDM in PVS (1998)</a:t>
+            </a:r>
+            <a:endParaRPr dirty="0"/>
           </a:p>
           <a:p>
             <a:pPr marL="914400" lvl="1" indent="-277177" algn="l" rtl="0">
@@ -14128,7 +14136,7 @@
               <a:buChar char="○"/>
             </a:pPr>
             <a:r>
-              <a:rPr lang="en" sz="900" u="sng">
+              <a:rPr lang="en" sz="900" u="sng" dirty="0">
                 <a:solidFill>
                   <a:schemeClr val="accent5"/>
                 </a:solidFill>
@@ -14143,10 +14151,10 @@
               <a:t>https://www.researchgate.net/publication/2510095_On_the_Verification_of_VDM_Specification_and_Refinement_with_PVS</a:t>
             </a:r>
             <a:r>
-              <a:rPr lang="en" sz="900"/>
+              <a:rPr lang="en" sz="900" dirty="0"/>
               <a:t> </a:t>
             </a:r>
-            <a:endParaRPr sz="900"/>
+            <a:endParaRPr sz="900" dirty="0"/>
           </a:p>
           <a:p>
             <a:pPr marL="457200" lvl="0" indent="-298767" algn="l" rtl="0">
@@ -14163,10 +14171,14 @@
               <a:buAutoNum type="arabicPeriod"/>
             </a:pPr>
             <a:r>
-              <a:rPr lang="en"/>
-              <a:t>Karabotsos (deep) embedding of VDM (LPF) in Isabelle/HOL (2005)</a:t>
-            </a:r>
-            <a:endParaRPr/>
+              <a:rPr lang="en" dirty="0" err="1"/>
+              <a:t>Karabotsos</a:t>
+            </a:r>
+            <a:r>
+              <a:rPr lang="en" dirty="0"/>
+              <a:t> (deep) embedding of VDM (LPF) in Isabelle/HOL (2005)</a:t>
+            </a:r>
+            <a:endParaRPr dirty="0"/>
           </a:p>
           <a:p>
             <a:pPr marL="914400" lvl="1" indent="-277177" algn="l" rtl="0">
@@ -14183,7 +14195,7 @@
               <a:buChar char="○"/>
             </a:pPr>
             <a:r>
-              <a:rPr lang="en" sz="900" u="sng">
+              <a:rPr lang="en" sz="900" u="sng" dirty="0">
                 <a:solidFill>
                   <a:schemeClr val="accent5"/>
                 </a:solidFill>
@@ -14201,7 +14213,7 @@
               </a:rPr>
               <a:t>https://spectrum.library.concordia.ca/id/eprint/8505/1/MR10289.pdf</a:t>
             </a:r>
-            <a:endParaRPr sz="900"/>
+            <a:endParaRPr sz="900" dirty="0"/>
           </a:p>
           <a:p>
             <a:pPr marL="457200" lvl="0" indent="-298767" algn="l" rtl="0">
@@ -14218,10 +14230,10 @@
               <a:buAutoNum type="arabicPeriod"/>
             </a:pPr>
             <a:r>
-              <a:rPr lang="en"/>
+              <a:rPr lang="en" dirty="0"/>
               <a:t>Freitas &amp; Woodcock soundness argument/result for VDM proofs in other logics (2008)</a:t>
             </a:r>
-            <a:endParaRPr/>
+            <a:endParaRPr dirty="0"/>
           </a:p>
           <a:p>
             <a:pPr marL="914400" lvl="1" indent="-287972" algn="l" rtl="0">
@@ -14238,11 +14250,19 @@
               <a:buChar char="○"/>
             </a:pPr>
             <a:r>
-              <a:rPr lang="en"/>
-              <a:t>Unifying Theories of Undefinedness [</a:t>
-            </a:r>
-            <a:r>
-              <a:rPr lang="en" sz="900" u="sng">
+              <a:rPr lang="en" dirty="0"/>
+              <a:t>Unifying Theories of </a:t>
+            </a:r>
+            <a:r>
+              <a:rPr lang="en" dirty="0" err="1"/>
+              <a:t>Undefinedness</a:t>
+            </a:r>
+            <a:r>
+              <a:rPr lang="en" dirty="0"/>
+              <a:t> [</a:t>
+            </a:r>
+            <a:r>
+              <a:rPr lang="en" sz="900" u="sng" dirty="0">
                 <a:solidFill>
                   <a:schemeClr val="hlink"/>
                 </a:solidFill>
@@ -14251,10 +14271,10 @@
               <a:t>https://doi.org/10.3233/978-1-58603-976-9-311</a:t>
             </a:r>
             <a:r>
-              <a:rPr lang="en"/>
+              <a:rPr lang="en" dirty="0"/>
               <a:t>]</a:t>
             </a:r>
-            <a:endParaRPr/>
+            <a:endParaRPr dirty="0"/>
           </a:p>
           <a:p>
             <a:pPr marL="914400" lvl="1" indent="-287972" algn="l" rtl="0">
@@ -14271,11 +14291,11 @@
               <a:buChar char="○"/>
             </a:pPr>
             <a:r>
-              <a:rPr lang="en"/>
+              <a:rPr lang="en" dirty="0"/>
               <a:t>Linking Z and VDM: (Z semi-classical) logic prover for VDM (LPF) theorems [</a:t>
             </a:r>
             <a:r>
-              <a:rPr lang="en" sz="700" u="sng">
+              <a:rPr lang="en" sz="700" u="sng" dirty="0">
                 <a:solidFill>
                   <a:schemeClr val="hlink"/>
                 </a:solidFill>
@@ -14288,10 +14308,10 @@
               <a:t>https://ieeexplore.ieee.org/document/4492887</a:t>
             </a:r>
             <a:r>
-              <a:rPr lang="en"/>
+              <a:rPr lang="en" dirty="0"/>
               <a:t>] </a:t>
             </a:r>
-            <a:endParaRPr/>
+            <a:endParaRPr dirty="0"/>
           </a:p>
           <a:p>
             <a:pPr marL="457200" lvl="0" indent="-298767" algn="l" rtl="0">
@@ -14308,10 +14328,22 @@
               <a:buAutoNum type="arabicPeriod"/>
             </a:pPr>
             <a:r>
-              <a:rPr lang="en"/>
-              <a:t>Vermolen, Hooman &amp; Larsen (shallow) embedding of VDM in HOL (2010)</a:t>
-            </a:r>
-            <a:endParaRPr/>
+              <a:rPr lang="en" dirty="0" err="1"/>
+              <a:t>Vermolen</a:t>
+            </a:r>
+            <a:r>
+              <a:rPr lang="en" dirty="0"/>
+              <a:t>, </a:t>
+            </a:r>
+            <a:r>
+              <a:rPr lang="en" dirty="0" err="1"/>
+              <a:t>Hooman</a:t>
+            </a:r>
+            <a:r>
+              <a:rPr lang="en" dirty="0"/>
+              <a:t> &amp; Larsen (shallow) embedding of VDM in HOL (2010)</a:t>
+            </a:r>
+            <a:endParaRPr dirty="0"/>
           </a:p>
           <a:p>
             <a:pPr marL="914400" lvl="1" indent="-287972" algn="l" rtl="0">
@@ -14328,11 +14360,11 @@
               <a:buChar char="○"/>
             </a:pPr>
             <a:r>
-              <a:rPr lang="en"/>
+              <a:rPr lang="en" dirty="0"/>
               <a:t>Hand-crafted proof tactics [</a:t>
             </a:r>
             <a:r>
-              <a:rPr lang="en" sz="900" u="sng">
+              <a:rPr lang="en" sz="900" u="sng" dirty="0">
                 <a:solidFill>
                   <a:schemeClr val="hlink"/>
                 </a:solidFill>
@@ -14345,10 +14377,10 @@
               <a:t>https://dl.acm.org/doi/10.1145/1774088.1774608</a:t>
             </a:r>
             <a:r>
-              <a:rPr lang="en"/>
+              <a:rPr lang="en" dirty="0"/>
               <a:t>]</a:t>
             </a:r>
-            <a:endParaRPr/>
+            <a:endParaRPr dirty="0"/>
           </a:p>
           <a:p>
             <a:pPr marL="457200" lvl="0" indent="-298767" algn="l" rtl="0">
@@ -14365,10 +14397,10 @@
               <a:buAutoNum type="arabicPeriod"/>
             </a:pPr>
             <a:r>
-              <a:rPr lang="en"/>
+              <a:rPr lang="en" dirty="0"/>
               <a:t>Freitas &amp; Whiteside (shallow) embedding of VDM in Isabelle/HOL (2014)</a:t>
             </a:r>
-            <a:endParaRPr/>
+            <a:endParaRPr dirty="0"/>
           </a:p>
           <a:p>
             <a:pPr marL="914400" lvl="1" indent="-287972" algn="l" rtl="0">
@@ -14385,11 +14417,11 @@
               <a:buChar char="○"/>
             </a:pPr>
             <a:r>
-              <a:rPr lang="en"/>
+              <a:rPr lang="en" dirty="0"/>
               <a:t>VDM theorems proved in Z and Isabelle/HOL [</a:t>
             </a:r>
             <a:r>
-              <a:rPr lang="en" sz="900" u="sng">
+              <a:rPr lang="en" sz="900" u="sng" dirty="0">
                 <a:solidFill>
                   <a:schemeClr val="hlink"/>
                 </a:solidFill>
@@ -14402,10 +14434,10 @@
               <a:t>https://link.springer.com/chapter/10.1007/978-3-319-06410-9_20</a:t>
             </a:r>
             <a:r>
-              <a:rPr lang="en"/>
+              <a:rPr lang="en" dirty="0"/>
               <a:t>]</a:t>
             </a:r>
-            <a:endParaRPr/>
+            <a:endParaRPr dirty="0"/>
           </a:p>
           <a:p>
             <a:pPr marL="457200" lvl="0" indent="-298767" algn="l" rtl="0">
@@ -14422,10 +14454,10 @@
               <a:buAutoNum type="arabicPeriod"/>
             </a:pPr>
             <a:r>
-              <a:rPr lang="en"/>
+              <a:rPr lang="en" dirty="0"/>
               <a:t>Freitas automated (shallow) embedding of VDM in Isabelle/HOL with proof crafting support (2021)</a:t>
             </a:r>
-            <a:endParaRPr/>
+            <a:endParaRPr dirty="0"/>
           </a:p>
           <a:p>
             <a:pPr marL="914400" lvl="1" indent="-287972" algn="l" rtl="0">
@@ -14442,11 +14474,11 @@
               <a:buChar char="○"/>
             </a:pPr>
             <a:r>
-              <a:rPr lang="en"/>
+              <a:rPr lang="en" dirty="0"/>
               <a:t>VDM toolkit project [</a:t>
             </a:r>
             <a:r>
-              <a:rPr lang="en" sz="900" u="sng">
+              <a:rPr lang="en" sz="900" u="sng" dirty="0">
                 <a:solidFill>
                   <a:schemeClr val="hlink"/>
                 </a:solidFill>
@@ -14459,10 +14491,10 @@
               <a:t>https://github.com/leouk/VDM_Toolkit</a:t>
             </a:r>
             <a:r>
-              <a:rPr lang="en"/>
+              <a:rPr lang="en" dirty="0"/>
               <a:t>]</a:t>
             </a:r>
-            <a:endParaRPr/>
+            <a:endParaRPr dirty="0"/>
           </a:p>
         </p:txBody>
       </p:sp>

</xml_diff>